<commit_message>
finished week6 QA presentation
</commit_message>
<xml_diff>
--- a/Assignments/bin/com/skillstorm/assignments/week6/Thursday/try-with-resources.pptx
+++ b/Assignments/bin/com/skillstorm/assignments/week6/Thursday/try-with-resources.pptx
@@ -5,15 +5,17 @@
     <p:sldMasterId id="2147483690" r:id="rId1"/>
   </p:sldMasterIdLst>
   <p:notesMasterIdLst>
-    <p:notesMasterId r:id="rId8"/>
+    <p:notesMasterId r:id="rId10"/>
   </p:notesMasterIdLst>
   <p:sldIdLst>
     <p:sldId id="256" r:id="rId2"/>
     <p:sldId id="257" r:id="rId3"/>
-    <p:sldId id="262" r:id="rId4"/>
-    <p:sldId id="263" r:id="rId5"/>
-    <p:sldId id="264" r:id="rId6"/>
-    <p:sldId id="259" r:id="rId7"/>
+    <p:sldId id="263" r:id="rId4"/>
+    <p:sldId id="264" r:id="rId5"/>
+    <p:sldId id="265" r:id="rId6"/>
+    <p:sldId id="266" r:id="rId7"/>
+    <p:sldId id="259" r:id="rId8"/>
+    <p:sldId id="267" r:id="rId9"/>
   </p:sldIdLst>
   <p:sldSz cx="12192000" cy="6858000"/>
   <p:notesSz cx="6858000" cy="9144000"/>
@@ -210,7 +212,7 @@
           <a:p>
             <a:fld id="{9E1B30F5-54D4-4E61-9CA0-E33448F96EF1}" type="datetimeFigureOut">
               <a:rPr lang="en-US" smtClean="0"/>
-              <a:t>12/19/2023</a:t>
+              <a:t>12/20/2023</a:t>
             </a:fld>
             <a:endParaRPr lang="en-US"/>
           </a:p>
@@ -761,6 +763,27 @@
               <a:t>But what else did I forget?</a:t>
             </a:r>
           </a:p>
+          <a:p>
+            <a:endParaRPr lang="en-US" dirty="0"/>
+          </a:p>
+          <a:p>
+            <a:r>
+              <a:rPr lang="en-US" dirty="0"/>
+              <a:t>***click***</a:t>
+            </a:r>
+          </a:p>
+          <a:p>
+            <a:endParaRPr lang="en-US" dirty="0"/>
+          </a:p>
+          <a:p>
+            <a:r>
+              <a:rPr lang="en-US" dirty="0"/>
+              <a:t>Ah, that’s right. I never closed the file in my code. This causes a resource leak! </a:t>
+            </a:r>
+          </a:p>
+          <a:p>
+            <a:endParaRPr lang="en-US" dirty="0"/>
+          </a:p>
         </p:txBody>
       </p:sp>
       <p:sp>
@@ -789,7 +812,7 @@
     </p:spTree>
     <p:extLst>
       <p:ext uri="{BB962C8B-B14F-4D97-AF65-F5344CB8AC3E}">
-        <p14:creationId xmlns:p14="http://schemas.microsoft.com/office/powerpoint/2010/main" val="4210093875"/>
+        <p14:creationId xmlns:p14="http://schemas.microsoft.com/office/powerpoint/2010/main" val="3513561945"/>
       </p:ext>
     </p:extLst>
   </p:cSld>
@@ -845,7 +868,7 @@
           <a:p>
             <a:r>
               <a:rPr lang="en-US" dirty="0"/>
-              <a:t>Ah, that’s right. I never closed the file in my code. This causes a resource leak!</a:t>
+              <a:t>Now, I could just add a statement to close my file just after the while loop, but if an exception is thrown before that line, it will never get executed, and our file will never be closed!</a:t>
             </a:r>
           </a:p>
           <a:p>
@@ -854,8 +877,11 @@
           <a:p>
             <a:r>
               <a:rPr lang="en-US" dirty="0"/>
-              <a:t>Now, I could just add a statement to close my file just after the while loop, but if an exception is thrown, the file still won’t be closed.</a:t>
+              <a:t>The next line of thought may lead us to also close the file in the catch block, just in case there was an exception, but that would be duplicating code, and bad practice.</a:t>
             </a:r>
+          </a:p>
+          <a:p>
+            <a:endParaRPr lang="en-US" dirty="0"/>
           </a:p>
           <a:p>
             <a:endParaRPr lang="en-US" dirty="0"/>
@@ -863,7 +889,7 @@
           <a:p>
             <a:r>
               <a:rPr lang="en-US" dirty="0"/>
-              <a:t>The next line of thought would lead you to maybe also close the file in the catch block, but that would be duplicating code, and bad practice.</a:t>
+              <a:t>Before Java 7, what you WOULD do is close the file in the finally block.</a:t>
             </a:r>
           </a:p>
         </p:txBody>
@@ -894,7 +920,7 @@
     </p:spTree>
     <p:extLst>
       <p:ext uri="{BB962C8B-B14F-4D97-AF65-F5344CB8AC3E}">
-        <p14:creationId xmlns:p14="http://schemas.microsoft.com/office/powerpoint/2010/main" val="3513561945"/>
+        <p14:creationId xmlns:p14="http://schemas.microsoft.com/office/powerpoint/2010/main" val="42277335"/>
       </p:ext>
     </p:extLst>
   </p:cSld>
@@ -950,7 +976,34 @@
           <a:p>
             <a:r>
               <a:rPr lang="en-US" dirty="0"/>
-              <a:t>Before Java 7, what you WOULD do is close the file in the finally block.</a:t>
+              <a:t>Since the finally block ALWAYS executes regardless of whether an exception was thrown, in older versions of Java, it was common practice to use the finally block to close resources.</a:t>
+            </a:r>
+          </a:p>
+          <a:p>
+            <a:endParaRPr lang="en-US" dirty="0"/>
+          </a:p>
+          <a:p>
+            <a:r>
+              <a:rPr lang="en-US" dirty="0"/>
+              <a:t>This right here is how that would look, but since I’m using Java 8, my IDE is flagging it because my resource objects are actually out of the scope of the finally block.</a:t>
+            </a:r>
+          </a:p>
+          <a:p>
+            <a:endParaRPr lang="en-US" dirty="0"/>
+          </a:p>
+          <a:p>
+            <a:r>
+              <a:rPr lang="en-US" dirty="0"/>
+              <a:t>This code is also starting to get a little cumbersome, and there is STILL the possibility of a resource leak if the print line and close methods BOTH throw exceptions!</a:t>
+            </a:r>
+          </a:p>
+          <a:p>
+            <a:endParaRPr lang="en-US" dirty="0"/>
+          </a:p>
+          <a:p>
+            <a:r>
+              <a:rPr lang="en-US" dirty="0"/>
+              <a:t>So what do we do instead in modern versions of Java? We use Try-With-Resources!</a:t>
             </a:r>
           </a:p>
         </p:txBody>
@@ -981,7 +1034,234 @@
     </p:spTree>
     <p:extLst>
       <p:ext uri="{BB962C8B-B14F-4D97-AF65-F5344CB8AC3E}">
-        <p14:creationId xmlns:p14="http://schemas.microsoft.com/office/powerpoint/2010/main" val="42277335"/>
+        <p14:creationId xmlns:p14="http://schemas.microsoft.com/office/powerpoint/2010/main" val="2804672389"/>
+      </p:ext>
+    </p:extLst>
+  </p:cSld>
+  <p:clrMapOvr>
+    <a:masterClrMapping/>
+  </p:clrMapOvr>
+</p:notes>
+</file>
+
+<file path=ppt/notesSlides/notesSlide6.xml><?xml version="1.0" encoding="utf-8"?>
+<p:notes xmlns:a="http://schemas.openxmlformats.org/drawingml/2006/main" xmlns:r="http://schemas.openxmlformats.org/officeDocument/2006/relationships" xmlns:p="http://schemas.openxmlformats.org/presentationml/2006/main">
+  <p:cSld>
+    <p:spTree>
+      <p:nvGrpSpPr>
+        <p:cNvPr id="1" name=""/>
+        <p:cNvGrpSpPr/>
+        <p:nvPr/>
+      </p:nvGrpSpPr>
+      <p:grpSpPr>
+        <a:xfrm>
+          <a:off x="0" y="0"/>
+          <a:ext cx="0" cy="0"/>
+          <a:chOff x="0" y="0"/>
+          <a:chExt cx="0" cy="0"/>
+        </a:xfrm>
+      </p:grpSpPr>
+      <p:sp>
+        <p:nvSpPr>
+          <p:cNvPr id="2" name="Slide Image Placeholder 1"/>
+          <p:cNvSpPr>
+            <a:spLocks noGrp="1" noRot="1" noChangeAspect="1"/>
+          </p:cNvSpPr>
+          <p:nvPr>
+            <p:ph type="sldImg"/>
+          </p:nvPr>
+        </p:nvSpPr>
+        <p:spPr/>
+      </p:sp>
+      <p:sp>
+        <p:nvSpPr>
+          <p:cNvPr id="3" name="Notes Placeholder 2"/>
+          <p:cNvSpPr>
+            <a:spLocks noGrp="1"/>
+          </p:cNvSpPr>
+          <p:nvPr>
+            <p:ph type="body" idx="1"/>
+          </p:nvPr>
+        </p:nvSpPr>
+        <p:spPr/>
+        <p:txBody>
+          <a:bodyPr/>
+          <a:lstStyle/>
+          <a:p>
+            <a:r>
+              <a:rPr lang="en-US" dirty="0"/>
+              <a:t>With this feature, the Developers of Java have given us a more efficient and less error-prone way to handle resources.</a:t>
+            </a:r>
+          </a:p>
+          <a:p>
+            <a:endParaRPr lang="en-US" dirty="0"/>
+          </a:p>
+          <a:p>
+            <a:r>
+              <a:rPr lang="en-US" dirty="0"/>
+              <a:t>First, we hand the resources inside parenthesis when we start a try catch block.</a:t>
+            </a:r>
+          </a:p>
+          <a:p>
+            <a:endParaRPr lang="en-US" dirty="0"/>
+          </a:p>
+          <a:p>
+            <a:r>
+              <a:rPr lang="en-US" dirty="0"/>
+              <a:t>Now, our resources will be available in the scope of both the try, catch and finally blocks while they’re needed, and Java will automatically close them afterward for us!</a:t>
+            </a:r>
+          </a:p>
+          <a:p>
+            <a:endParaRPr lang="en-US" dirty="0"/>
+          </a:p>
+          <a:p>
+            <a:r>
+              <a:rPr lang="en-US" dirty="0"/>
+              <a:t>This is really convenient, and makes our code more concise and easy to read. Plus, we don’t have to worry about forgetting to close our resources.</a:t>
+            </a:r>
+          </a:p>
+          <a:p>
+            <a:endParaRPr lang="en-US" dirty="0"/>
+          </a:p>
+          <a:p>
+            <a:r>
+              <a:rPr lang="en-US" dirty="0"/>
+              <a:t>We can also still use the catch and finally blocks if needed. The resources will be automatically closed before the catch or finally block is run.</a:t>
+            </a:r>
+          </a:p>
+          <a:p>
+            <a:endParaRPr lang="en-US" dirty="0"/>
+          </a:p>
+          <a:p>
+            <a:r>
+              <a:rPr lang="en-US" dirty="0"/>
+              <a:t>This feature is available in Java 7 and later, and possible for any resources that implement the </a:t>
+            </a:r>
+            <a:r>
+              <a:rPr lang="en-US" dirty="0" err="1"/>
+              <a:t>java.lang.AutoCloseable</a:t>
+            </a:r>
+            <a:r>
+              <a:rPr lang="en-US" dirty="0"/>
+              <a:t> interface.</a:t>
+            </a:r>
+          </a:p>
+        </p:txBody>
+      </p:sp>
+      <p:sp>
+        <p:nvSpPr>
+          <p:cNvPr id="4" name="Slide Number Placeholder 3"/>
+          <p:cNvSpPr>
+            <a:spLocks noGrp="1"/>
+          </p:cNvSpPr>
+          <p:nvPr>
+            <p:ph type="sldNum" sz="quarter" idx="5"/>
+          </p:nvPr>
+        </p:nvSpPr>
+        <p:spPr/>
+        <p:txBody>
+          <a:bodyPr/>
+          <a:lstStyle/>
+          <a:p>
+            <a:fld id="{8B9B2A1B-074E-4986-9553-3DDF12882222}" type="slidenum">
+              <a:rPr lang="en-US" smtClean="0"/>
+              <a:t>6</a:t>
+            </a:fld>
+            <a:endParaRPr lang="en-US"/>
+          </a:p>
+        </p:txBody>
+      </p:sp>
+    </p:spTree>
+    <p:extLst>
+      <p:ext uri="{BB962C8B-B14F-4D97-AF65-F5344CB8AC3E}">
+        <p14:creationId xmlns:p14="http://schemas.microsoft.com/office/powerpoint/2010/main" val="3690194732"/>
+      </p:ext>
+    </p:extLst>
+  </p:cSld>
+  <p:clrMapOvr>
+    <a:masterClrMapping/>
+  </p:clrMapOvr>
+</p:notes>
+</file>
+
+<file path=ppt/notesSlides/notesSlide7.xml><?xml version="1.0" encoding="utf-8"?>
+<p:notes xmlns:a="http://schemas.openxmlformats.org/drawingml/2006/main" xmlns:r="http://schemas.openxmlformats.org/officeDocument/2006/relationships" xmlns:p="http://schemas.openxmlformats.org/presentationml/2006/main">
+  <p:cSld>
+    <p:spTree>
+      <p:nvGrpSpPr>
+        <p:cNvPr id="1" name=""/>
+        <p:cNvGrpSpPr/>
+        <p:nvPr/>
+      </p:nvGrpSpPr>
+      <p:grpSpPr>
+        <a:xfrm>
+          <a:off x="0" y="0"/>
+          <a:ext cx="0" cy="0"/>
+          <a:chOff x="0" y="0"/>
+          <a:chExt cx="0" cy="0"/>
+        </a:xfrm>
+      </p:grpSpPr>
+      <p:sp>
+        <p:nvSpPr>
+          <p:cNvPr id="2" name="Slide Image Placeholder 1"/>
+          <p:cNvSpPr>
+            <a:spLocks noGrp="1" noRot="1" noChangeAspect="1"/>
+          </p:cNvSpPr>
+          <p:nvPr>
+            <p:ph type="sldImg"/>
+          </p:nvPr>
+        </p:nvSpPr>
+        <p:spPr/>
+      </p:sp>
+      <p:sp>
+        <p:nvSpPr>
+          <p:cNvPr id="3" name="Notes Placeholder 2"/>
+          <p:cNvSpPr>
+            <a:spLocks noGrp="1"/>
+          </p:cNvSpPr>
+          <p:nvPr>
+            <p:ph type="body" idx="1"/>
+          </p:nvPr>
+        </p:nvSpPr>
+        <p:spPr/>
+        <p:txBody>
+          <a:bodyPr/>
+          <a:lstStyle/>
+          <a:p>
+            <a:r>
+              <a:rPr lang="en-US" dirty="0"/>
+              <a:t>As you can see here, there are a lot of resources that are Auto-Closeable. So, in the future, when you’re working with external files, databases, network connections, etc., try-with-resources will be there to help.</a:t>
+            </a:r>
+          </a:p>
+        </p:txBody>
+      </p:sp>
+      <p:sp>
+        <p:nvSpPr>
+          <p:cNvPr id="4" name="Slide Number Placeholder 3"/>
+          <p:cNvSpPr>
+            <a:spLocks noGrp="1"/>
+          </p:cNvSpPr>
+          <p:nvPr>
+            <p:ph type="sldNum" sz="quarter" idx="5"/>
+          </p:nvPr>
+        </p:nvSpPr>
+        <p:spPr/>
+        <p:txBody>
+          <a:bodyPr/>
+          <a:lstStyle/>
+          <a:p>
+            <a:fld id="{8B9B2A1B-074E-4986-9553-3DDF12882222}" type="slidenum">
+              <a:rPr lang="en-US" smtClean="0"/>
+              <a:t>7</a:t>
+            </a:fld>
+            <a:endParaRPr lang="en-US"/>
+          </a:p>
+        </p:txBody>
+      </p:sp>
+    </p:spTree>
+    <p:extLst>
+      <p:ext uri="{BB962C8B-B14F-4D97-AF65-F5344CB8AC3E}">
+        <p14:creationId xmlns:p14="http://schemas.microsoft.com/office/powerpoint/2010/main" val="1219737383"/>
       </p:ext>
     </p:extLst>
   </p:cSld>
@@ -1220,7 +1500,7 @@
           <a:p>
             <a:fld id="{846CE7D5-CF57-46EF-B807-FDD0502418D4}" type="datetimeFigureOut">
               <a:rPr lang="en-US" smtClean="0"/>
-              <a:t>12/19/2023</a:t>
+              <a:t>12/20/2023</a:t>
             </a:fld>
             <a:endParaRPr lang="en-US"/>
           </a:p>
@@ -1554,7 +1834,7 @@
           <a:p>
             <a:fld id="{846CE7D5-CF57-46EF-B807-FDD0502418D4}" type="datetimeFigureOut">
               <a:rPr lang="en-US" smtClean="0"/>
-              <a:t>12/19/2023</a:t>
+              <a:t>12/20/2023</a:t>
             </a:fld>
             <a:endParaRPr lang="en-US"/>
           </a:p>
@@ -1832,7 +2112,7 @@
           <a:p>
             <a:fld id="{846CE7D5-CF57-46EF-B807-FDD0502418D4}" type="datetimeFigureOut">
               <a:rPr lang="en-US" smtClean="0"/>
-              <a:t>12/19/2023</a:t>
+              <a:t>12/20/2023</a:t>
             </a:fld>
             <a:endParaRPr lang="en-US"/>
           </a:p>
@@ -2400,7 +2680,7 @@
           <a:p>
             <a:fld id="{846CE7D5-CF57-46EF-B807-FDD0502418D4}" type="datetimeFigureOut">
               <a:rPr lang="en-US" smtClean="0"/>
-              <a:t>12/19/2023</a:t>
+              <a:t>12/20/2023</a:t>
             </a:fld>
             <a:endParaRPr lang="en-US"/>
           </a:p>
@@ -2678,7 +2958,7 @@
           <a:p>
             <a:fld id="{846CE7D5-CF57-46EF-B807-FDD0502418D4}" type="datetimeFigureOut">
               <a:rPr lang="en-US" smtClean="0"/>
-              <a:t>12/19/2023</a:t>
+              <a:t>12/20/2023</a:t>
             </a:fld>
             <a:endParaRPr lang="en-US"/>
           </a:p>
@@ -3240,7 +3520,7 @@
           <a:p>
             <a:fld id="{846CE7D5-CF57-46EF-B807-FDD0502418D4}" type="datetimeFigureOut">
               <a:rPr lang="en-US" smtClean="0"/>
-              <a:t>12/19/2023</a:t>
+              <a:t>12/20/2023</a:t>
             </a:fld>
             <a:endParaRPr lang="en-US"/>
           </a:p>
@@ -3567,7 +3847,7 @@
           <a:p>
             <a:fld id="{846CE7D5-CF57-46EF-B807-FDD0502418D4}" type="datetimeFigureOut">
               <a:rPr lang="en-US" smtClean="0"/>
-              <a:t>12/19/2023</a:t>
+              <a:t>12/20/2023</a:t>
             </a:fld>
             <a:endParaRPr lang="en-US"/>
           </a:p>
@@ -3744,7 +4024,7 @@
           <a:p>
             <a:fld id="{846CE7D5-CF57-46EF-B807-FDD0502418D4}" type="datetimeFigureOut">
               <a:rPr lang="en-US" smtClean="0"/>
-              <a:t>12/19/2023</a:t>
+              <a:t>12/20/2023</a:t>
             </a:fld>
             <a:endParaRPr lang="en-US"/>
           </a:p>
@@ -3982,7 +4262,7 @@
           <a:p>
             <a:fld id="{846CE7D5-CF57-46EF-B807-FDD0502418D4}" type="datetimeFigureOut">
               <a:rPr lang="en-US" smtClean="0"/>
-              <a:t>12/19/2023</a:t>
+              <a:t>12/20/2023</a:t>
             </a:fld>
             <a:endParaRPr lang="en-US"/>
           </a:p>
@@ -4182,7 +4462,7 @@
           <a:p>
             <a:fld id="{846CE7D5-CF57-46EF-B807-FDD0502418D4}" type="datetimeFigureOut">
               <a:rPr lang="en-US" smtClean="0"/>
-              <a:t>12/19/2023</a:t>
+              <a:t>12/20/2023</a:t>
             </a:fld>
             <a:endParaRPr lang="en-US"/>
           </a:p>
@@ -4458,7 +4738,7 @@
           <a:p>
             <a:fld id="{846CE7D5-CF57-46EF-B807-FDD0502418D4}" type="datetimeFigureOut">
               <a:rPr lang="en-US" smtClean="0"/>
-              <a:t>12/19/2023</a:t>
+              <a:t>12/20/2023</a:t>
             </a:fld>
             <a:endParaRPr lang="en-US"/>
           </a:p>
@@ -4724,7 +5004,7 @@
           <a:p>
             <a:fld id="{846CE7D5-CF57-46EF-B807-FDD0502418D4}" type="datetimeFigureOut">
               <a:rPr lang="en-US" smtClean="0"/>
-              <a:t>12/19/2023</a:t>
+              <a:t>12/20/2023</a:t>
             </a:fld>
             <a:endParaRPr lang="en-US"/>
           </a:p>
@@ -5098,7 +5378,7 @@
           <a:p>
             <a:fld id="{846CE7D5-CF57-46EF-B807-FDD0502418D4}" type="datetimeFigureOut">
               <a:rPr lang="en-US" smtClean="0"/>
-              <a:t>12/19/2023</a:t>
+              <a:t>12/20/2023</a:t>
             </a:fld>
             <a:endParaRPr lang="en-US"/>
           </a:p>
@@ -5246,7 +5526,7 @@
           <a:p>
             <a:fld id="{846CE7D5-CF57-46EF-B807-FDD0502418D4}" type="datetimeFigureOut">
               <a:rPr lang="en-US" smtClean="0"/>
-              <a:t>12/19/2023</a:t>
+              <a:t>12/20/2023</a:t>
             </a:fld>
             <a:endParaRPr lang="en-US"/>
           </a:p>
@@ -5371,7 +5651,7 @@
           <a:p>
             <a:fld id="{846CE7D5-CF57-46EF-B807-FDD0502418D4}" type="datetimeFigureOut">
               <a:rPr lang="en-US" smtClean="0"/>
-              <a:t>12/19/2023</a:t>
+              <a:t>12/20/2023</a:t>
             </a:fld>
             <a:endParaRPr lang="en-US"/>
           </a:p>
@@ -5656,7 +5936,7 @@
           <a:p>
             <a:fld id="{846CE7D5-CF57-46EF-B807-FDD0502418D4}" type="datetimeFigureOut">
               <a:rPr lang="en-US" smtClean="0"/>
-              <a:t>12/19/2023</a:t>
+              <a:t>12/20/2023</a:t>
             </a:fld>
             <a:endParaRPr lang="en-US"/>
           </a:p>
@@ -5980,7 +6260,7 @@
           <a:p>
             <a:fld id="{846CE7D5-CF57-46EF-B807-FDD0502418D4}" type="datetimeFigureOut">
               <a:rPr lang="en-US" smtClean="0"/>
-              <a:t>12/19/2023</a:t>
+              <a:t>12/20/2023</a:t>
             </a:fld>
             <a:endParaRPr lang="en-US"/>
           </a:p>
@@ -6194,7 +6474,7 @@
           <a:p>
             <a:fld id="{846CE7D5-CF57-46EF-B807-FDD0502418D4}" type="datetimeFigureOut">
               <a:rPr lang="en-US" smtClean="0"/>
-              <a:t>12/19/2023</a:t>
+              <a:t>12/20/2023</a:t>
             </a:fld>
             <a:endParaRPr lang="en-US"/>
           </a:p>
@@ -11619,120 +11899,20 @@
           <p:nvPr/>
         </p:nvPicPr>
         <p:blipFill>
-          <a:blip r:embed="rId3"/>
-          <a:stretch>
-            <a:fillRect/>
-          </a:stretch>
+          <a:blip r:embed="rId3">
+            <a:extLst>
+              <a:ext uri="{28A0092B-C50C-407E-A947-70E740481C1C}">
+                <a14:useLocalDpi xmlns:a14="http://schemas.microsoft.com/office/drawing/2010/main" val="0"/>
+              </a:ext>
+            </a:extLst>
+          </a:blip>
+          <a:srcRect/>
+          <a:stretch/>
         </p:blipFill>
         <p:spPr>
           <a:xfrm>
-            <a:off x="685801" y="1589940"/>
-            <a:ext cx="10917174" cy="5268060"/>
-          </a:xfrm>
-          <a:prstGeom prst="rect">
-            <a:avLst/>
-          </a:prstGeom>
-          <a:ln w="38100" cap="sq">
-            <a:solidFill>
-              <a:srgbClr val="000000"/>
-            </a:solidFill>
-            <a:prstDash val="solid"/>
-            <a:miter lim="800000"/>
-          </a:ln>
-          <a:effectLst>
-            <a:outerShdw blurRad="50800" dist="38100" dir="2700000" algn="tl" rotWithShape="0">
-              <a:srgbClr val="000000">
-                <a:alpha val="43000"/>
-              </a:srgbClr>
-            </a:outerShdw>
-          </a:effectLst>
-        </p:spPr>
-      </p:pic>
-    </p:spTree>
-    <p:extLst>
-      <p:ext uri="{BB962C8B-B14F-4D97-AF65-F5344CB8AC3E}">
-        <p14:creationId xmlns:p14="http://schemas.microsoft.com/office/powerpoint/2010/main" val="1081765222"/>
-      </p:ext>
-    </p:extLst>
-  </p:cSld>
-  <p:clrMapOvr>
-    <a:masterClrMapping/>
-  </p:clrMapOvr>
-</p:sld>
-</file>
-
-<file path=ppt/slides/slide4.xml><?xml version="1.0" encoding="utf-8"?>
-<p:sld xmlns:a="http://schemas.openxmlformats.org/drawingml/2006/main" xmlns:r="http://schemas.openxmlformats.org/officeDocument/2006/relationships" xmlns:p="http://schemas.openxmlformats.org/presentationml/2006/main">
-  <p:cSld>
-    <p:spTree>
-      <p:nvGrpSpPr>
-        <p:cNvPr id="1" name=""/>
-        <p:cNvGrpSpPr/>
-        <p:nvPr/>
-      </p:nvGrpSpPr>
-      <p:grpSpPr>
-        <a:xfrm>
-          <a:off x="0" y="0"/>
-          <a:ext cx="0" cy="0"/>
-          <a:chOff x="0" y="0"/>
-          <a:chExt cx="0" cy="0"/>
-        </a:xfrm>
-      </p:grpSpPr>
-      <p:sp>
-        <p:nvSpPr>
-          <p:cNvPr id="2" name="Title 1">
-            <a:extLst>
-              <a:ext uri="{FF2B5EF4-FFF2-40B4-BE49-F238E27FC236}">
-                <a16:creationId xmlns:a16="http://schemas.microsoft.com/office/drawing/2014/main" id="{022E3451-22A9-1944-BB12-B57840DEB104}"/>
-              </a:ext>
-            </a:extLst>
-          </p:cNvPr>
-          <p:cNvSpPr>
-            <a:spLocks noGrp="1"/>
-          </p:cNvSpPr>
-          <p:nvPr>
-            <p:ph type="title"/>
-          </p:nvPr>
-        </p:nvSpPr>
-        <p:spPr/>
-        <p:txBody>
-          <a:bodyPr/>
-          <a:lstStyle/>
-          <a:p>
-            <a:r>
-              <a:rPr lang="en-US" dirty="0">
-                <a:cs typeface="Calibri Light"/>
-              </a:rPr>
-              <a:t>Working with resources in java</a:t>
-            </a:r>
-            <a:endParaRPr lang="en-US" dirty="0"/>
-          </a:p>
-        </p:txBody>
-      </p:sp>
-      <p:pic>
-        <p:nvPicPr>
-          <p:cNvPr id="4" name="Picture 3">
-            <a:extLst>
-              <a:ext uri="{FF2B5EF4-FFF2-40B4-BE49-F238E27FC236}">
-                <a16:creationId xmlns:a16="http://schemas.microsoft.com/office/drawing/2014/main" id="{A1E22186-753D-F423-DAC9-3D489B978D2F}"/>
-              </a:ext>
-            </a:extLst>
-          </p:cNvPr>
-          <p:cNvPicPr>
-            <a:picLocks noChangeAspect="1"/>
-          </p:cNvPicPr>
-          <p:nvPr/>
-        </p:nvPicPr>
-        <p:blipFill>
-          <a:blip r:embed="rId3"/>
-          <a:stretch>
-            <a:fillRect/>
-          </a:stretch>
-        </p:blipFill>
-        <p:spPr>
-          <a:xfrm>
-            <a:off x="685801" y="1589940"/>
-            <a:ext cx="10917174" cy="5268060"/>
+            <a:off x="685801" y="2210515"/>
+            <a:ext cx="10917174" cy="4026909"/>
           </a:xfrm>
           <a:prstGeom prst="rect">
             <a:avLst/>
@@ -11874,6 +12054,333 @@
   <p:clrMapOvr>
     <a:masterClrMapping/>
   </p:clrMapOvr>
+  <p:timing>
+    <p:tnLst>
+      <p:par>
+        <p:cTn id="1" dur="indefinite" restart="never" nodeType="tmRoot">
+          <p:childTnLst>
+            <p:seq concurrent="1" nextAc="seek">
+              <p:cTn id="2" dur="indefinite" nodeType="mainSeq">
+                <p:childTnLst>
+                  <p:par>
+                    <p:cTn id="3" fill="hold">
+                      <p:stCondLst>
+                        <p:cond delay="indefinite"/>
+                      </p:stCondLst>
+                      <p:childTnLst>
+                        <p:par>
+                          <p:cTn id="4" fill="hold">
+                            <p:stCondLst>
+                              <p:cond delay="0"/>
+                            </p:stCondLst>
+                            <p:childTnLst>
+                              <p:par>
+                                <p:cTn id="5" presetID="2" presetClass="entr" presetSubtype="4" fill="hold" nodeType="clickEffect">
+                                  <p:stCondLst>
+                                    <p:cond delay="0"/>
+                                  </p:stCondLst>
+                                  <p:childTnLst>
+                                    <p:set>
+                                      <p:cBhvr>
+                                        <p:cTn id="6" dur="1" fill="hold">
+                                          <p:stCondLst>
+                                            <p:cond delay="0"/>
+                                          </p:stCondLst>
+                                        </p:cTn>
+                                        <p:tgtEl>
+                                          <p:spTgt spid="5"/>
+                                        </p:tgtEl>
+                                        <p:attrNameLst>
+                                          <p:attrName>style.visibility</p:attrName>
+                                        </p:attrNameLst>
+                                      </p:cBhvr>
+                                      <p:to>
+                                        <p:strVal val="visible"/>
+                                      </p:to>
+                                    </p:set>
+                                    <p:anim calcmode="lin" valueType="num">
+                                      <p:cBhvr additive="base">
+                                        <p:cTn id="7" dur="500" fill="hold"/>
+                                        <p:tgtEl>
+                                          <p:spTgt spid="5"/>
+                                        </p:tgtEl>
+                                        <p:attrNameLst>
+                                          <p:attrName>ppt_x</p:attrName>
+                                        </p:attrNameLst>
+                                      </p:cBhvr>
+                                      <p:tavLst>
+                                        <p:tav tm="0">
+                                          <p:val>
+                                            <p:strVal val="#ppt_x"/>
+                                          </p:val>
+                                        </p:tav>
+                                        <p:tav tm="100000">
+                                          <p:val>
+                                            <p:strVal val="#ppt_x"/>
+                                          </p:val>
+                                        </p:tav>
+                                      </p:tavLst>
+                                    </p:anim>
+                                    <p:anim calcmode="lin" valueType="num">
+                                      <p:cBhvr additive="base">
+                                        <p:cTn id="8" dur="500" fill="hold"/>
+                                        <p:tgtEl>
+                                          <p:spTgt spid="5"/>
+                                        </p:tgtEl>
+                                        <p:attrNameLst>
+                                          <p:attrName>ppt_y</p:attrName>
+                                        </p:attrNameLst>
+                                      </p:cBhvr>
+                                      <p:tavLst>
+                                        <p:tav tm="0">
+                                          <p:val>
+                                            <p:strVal val="1+#ppt_h/2"/>
+                                          </p:val>
+                                        </p:tav>
+                                        <p:tav tm="100000">
+                                          <p:val>
+                                            <p:strVal val="#ppt_y"/>
+                                          </p:val>
+                                        </p:tav>
+                                      </p:tavLst>
+                                    </p:anim>
+                                  </p:childTnLst>
+                                </p:cTn>
+                              </p:par>
+                            </p:childTnLst>
+                          </p:cTn>
+                        </p:par>
+                        <p:par>
+                          <p:cTn id="9" fill="hold">
+                            <p:stCondLst>
+                              <p:cond delay="500"/>
+                            </p:stCondLst>
+                            <p:childTnLst>
+                              <p:par>
+                                <p:cTn id="10" presetID="6" presetClass="entr" presetSubtype="16" fill="hold" nodeType="afterEffect">
+                                  <p:stCondLst>
+                                    <p:cond delay="0"/>
+                                  </p:stCondLst>
+                                  <p:childTnLst>
+                                    <p:set>
+                                      <p:cBhvr>
+                                        <p:cTn id="11" dur="1" fill="hold">
+                                          <p:stCondLst>
+                                            <p:cond delay="0"/>
+                                          </p:stCondLst>
+                                        </p:cTn>
+                                        <p:tgtEl>
+                                          <p:spTgt spid="7"/>
+                                        </p:tgtEl>
+                                        <p:attrNameLst>
+                                          <p:attrName>style.visibility</p:attrName>
+                                        </p:attrNameLst>
+                                      </p:cBhvr>
+                                      <p:to>
+                                        <p:strVal val="visible"/>
+                                      </p:to>
+                                    </p:set>
+                                    <p:animEffect transition="in" filter="circle(in)">
+                                      <p:cBhvr>
+                                        <p:cTn id="12" dur="2000"/>
+                                        <p:tgtEl>
+                                          <p:spTgt spid="7"/>
+                                        </p:tgtEl>
+                                      </p:cBhvr>
+                                    </p:animEffect>
+                                  </p:childTnLst>
+                                </p:cTn>
+                              </p:par>
+                            </p:childTnLst>
+                          </p:cTn>
+                        </p:par>
+                      </p:childTnLst>
+                    </p:cTn>
+                  </p:par>
+                </p:childTnLst>
+              </p:cTn>
+              <p:prevCondLst>
+                <p:cond evt="onPrev" delay="0">
+                  <p:tgtEl>
+                    <p:sldTgt/>
+                  </p:tgtEl>
+                </p:cond>
+              </p:prevCondLst>
+              <p:nextCondLst>
+                <p:cond evt="onNext" delay="0">
+                  <p:tgtEl>
+                    <p:sldTgt/>
+                  </p:tgtEl>
+                </p:cond>
+              </p:nextCondLst>
+            </p:seq>
+          </p:childTnLst>
+        </p:cTn>
+      </p:par>
+    </p:tnLst>
+  </p:timing>
+</p:sld>
+</file>
+
+<file path=ppt/slides/slide4.xml><?xml version="1.0" encoding="utf-8"?>
+<p:sld xmlns:a="http://schemas.openxmlformats.org/drawingml/2006/main" xmlns:r="http://schemas.openxmlformats.org/officeDocument/2006/relationships" xmlns:p="http://schemas.openxmlformats.org/presentationml/2006/main">
+  <p:cSld>
+    <p:spTree>
+      <p:nvGrpSpPr>
+        <p:cNvPr id="1" name=""/>
+        <p:cNvGrpSpPr/>
+        <p:nvPr/>
+      </p:nvGrpSpPr>
+      <p:grpSpPr>
+        <a:xfrm>
+          <a:off x="0" y="0"/>
+          <a:ext cx="0" cy="0"/>
+          <a:chOff x="0" y="0"/>
+          <a:chExt cx="0" cy="0"/>
+        </a:xfrm>
+      </p:grpSpPr>
+      <p:sp>
+        <p:nvSpPr>
+          <p:cNvPr id="2" name="Title 1">
+            <a:extLst>
+              <a:ext uri="{FF2B5EF4-FFF2-40B4-BE49-F238E27FC236}">
+                <a16:creationId xmlns:a16="http://schemas.microsoft.com/office/drawing/2014/main" id="{022E3451-22A9-1944-BB12-B57840DEB104}"/>
+              </a:ext>
+            </a:extLst>
+          </p:cNvPr>
+          <p:cNvSpPr>
+            <a:spLocks noGrp="1"/>
+          </p:cNvSpPr>
+          <p:nvPr>
+            <p:ph type="title"/>
+          </p:nvPr>
+        </p:nvSpPr>
+        <p:spPr/>
+        <p:txBody>
+          <a:bodyPr/>
+          <a:lstStyle/>
+          <a:p>
+            <a:r>
+              <a:rPr lang="en-US" dirty="0">
+                <a:cs typeface="Calibri Light"/>
+              </a:rPr>
+              <a:t>Working with resources in java</a:t>
+            </a:r>
+            <a:endParaRPr lang="en-US" dirty="0"/>
+          </a:p>
+        </p:txBody>
+      </p:sp>
+      <p:pic>
+        <p:nvPicPr>
+          <p:cNvPr id="4" name="Picture 3">
+            <a:extLst>
+              <a:ext uri="{FF2B5EF4-FFF2-40B4-BE49-F238E27FC236}">
+                <a16:creationId xmlns:a16="http://schemas.microsoft.com/office/drawing/2014/main" id="{A1E22186-753D-F423-DAC9-3D489B978D2F}"/>
+              </a:ext>
+            </a:extLst>
+          </p:cNvPr>
+          <p:cNvPicPr>
+            <a:picLocks noChangeAspect="1"/>
+          </p:cNvPicPr>
+          <p:nvPr/>
+        </p:nvPicPr>
+        <p:blipFill>
+          <a:blip r:embed="rId3">
+            <a:extLst>
+              <a:ext uri="{28A0092B-C50C-407E-A947-70E740481C1C}">
+                <a14:useLocalDpi xmlns:a14="http://schemas.microsoft.com/office/drawing/2010/main" val="0"/>
+              </a:ext>
+            </a:extLst>
+          </a:blip>
+          <a:srcRect/>
+          <a:stretch/>
+        </p:blipFill>
+        <p:spPr>
+          <a:xfrm>
+            <a:off x="685801" y="2045566"/>
+            <a:ext cx="10917174" cy="4356808"/>
+          </a:xfrm>
+          <a:prstGeom prst="rect">
+            <a:avLst/>
+          </a:prstGeom>
+          <a:ln w="38100" cap="sq">
+            <a:solidFill>
+              <a:srgbClr val="000000"/>
+            </a:solidFill>
+            <a:prstDash val="solid"/>
+            <a:miter lim="800000"/>
+          </a:ln>
+          <a:effectLst>
+            <a:outerShdw blurRad="50800" dist="38100" dir="2700000" algn="tl" rotWithShape="0">
+              <a:srgbClr val="000000">
+                <a:alpha val="43000"/>
+              </a:srgbClr>
+            </a:outerShdw>
+          </a:effectLst>
+        </p:spPr>
+      </p:pic>
+      <p:sp>
+        <p:nvSpPr>
+          <p:cNvPr id="3" name="Rectangle 2">
+            <a:extLst>
+              <a:ext uri="{FF2B5EF4-FFF2-40B4-BE49-F238E27FC236}">
+                <a16:creationId xmlns:a16="http://schemas.microsoft.com/office/drawing/2014/main" id="{E05DAF03-A9D2-D9C2-6F14-04A86A4F3D4F}"/>
+              </a:ext>
+            </a:extLst>
+          </p:cNvPr>
+          <p:cNvSpPr/>
+          <p:nvPr/>
+        </p:nvSpPr>
+        <p:spPr>
+          <a:xfrm>
+            <a:off x="1280160" y="4800600"/>
+            <a:ext cx="3893820" cy="426720"/>
+          </a:xfrm>
+          <a:prstGeom prst="rect">
+            <a:avLst/>
+          </a:prstGeom>
+          <a:noFill/>
+          <a:ln w="57150">
+            <a:solidFill>
+              <a:srgbClr val="FFFF00"/>
+            </a:solidFill>
+          </a:ln>
+        </p:spPr>
+        <p:style>
+          <a:lnRef idx="2">
+            <a:schemeClr val="accent1">
+              <a:shade val="15000"/>
+            </a:schemeClr>
+          </a:lnRef>
+          <a:fillRef idx="1">
+            <a:schemeClr val="accent1"/>
+          </a:fillRef>
+          <a:effectRef idx="0">
+            <a:schemeClr val="accent1"/>
+          </a:effectRef>
+          <a:fontRef idx="minor">
+            <a:schemeClr val="lt1"/>
+          </a:fontRef>
+        </p:style>
+        <p:txBody>
+          <a:bodyPr rtlCol="0" anchor="ctr"/>
+          <a:lstStyle/>
+          <a:p>
+            <a:pPr algn="ctr"/>
+            <a:endParaRPr lang="en-US"/>
+          </a:p>
+        </p:txBody>
+      </p:sp>
+    </p:spTree>
+    <p:extLst>
+      <p:ext uri="{BB962C8B-B14F-4D97-AF65-F5344CB8AC3E}">
+        <p14:creationId xmlns:p14="http://schemas.microsoft.com/office/powerpoint/2010/main" val="3873202710"/>
+      </p:ext>
+    </p:extLst>
+  </p:cSld>
+  <p:clrMapOvr>
+    <a:masterClrMapping/>
+  </p:clrMapOvr>
 </p:sld>
 </file>
 
@@ -11940,15 +12447,20 @@
           <p:nvPr/>
         </p:nvPicPr>
         <p:blipFill>
-          <a:blip r:embed="rId3"/>
-          <a:stretch>
-            <a:fillRect/>
-          </a:stretch>
+          <a:blip r:embed="rId3">
+            <a:extLst>
+              <a:ext uri="{28A0092B-C50C-407E-A947-70E740481C1C}">
+                <a14:useLocalDpi xmlns:a14="http://schemas.microsoft.com/office/drawing/2010/main" val="0"/>
+              </a:ext>
+            </a:extLst>
+          </a:blip>
+          <a:srcRect/>
+          <a:stretch/>
         </p:blipFill>
         <p:spPr>
           <a:xfrm>
-            <a:off x="685801" y="1589940"/>
-            <a:ext cx="10917174" cy="5268060"/>
+            <a:off x="1595245" y="2045566"/>
+            <a:ext cx="9098285" cy="4356808"/>
           </a:xfrm>
           <a:prstGeom prst="rect">
             <a:avLst/>
@@ -11972,7 +12484,7 @@
     </p:spTree>
     <p:extLst>
       <p:ext uri="{BB962C8B-B14F-4D97-AF65-F5344CB8AC3E}">
-        <p14:creationId xmlns:p14="http://schemas.microsoft.com/office/powerpoint/2010/main" val="3873202710"/>
+        <p14:creationId xmlns:p14="http://schemas.microsoft.com/office/powerpoint/2010/main" val="4207548837"/>
       </p:ext>
     </p:extLst>
   </p:cSld>
@@ -12004,6 +12516,168 @@
           <p:cNvPr id="2" name="Title 1">
             <a:extLst>
               <a:ext uri="{FF2B5EF4-FFF2-40B4-BE49-F238E27FC236}">
+                <a16:creationId xmlns:a16="http://schemas.microsoft.com/office/drawing/2014/main" id="{022E3451-22A9-1944-BB12-B57840DEB104}"/>
+              </a:ext>
+            </a:extLst>
+          </p:cNvPr>
+          <p:cNvSpPr>
+            <a:spLocks noGrp="1"/>
+          </p:cNvSpPr>
+          <p:nvPr>
+            <p:ph type="title"/>
+          </p:nvPr>
+        </p:nvSpPr>
+        <p:spPr/>
+        <p:txBody>
+          <a:bodyPr/>
+          <a:lstStyle/>
+          <a:p>
+            <a:r>
+              <a:rPr lang="en-US" dirty="0">
+                <a:cs typeface="Calibri Light"/>
+              </a:rPr>
+              <a:t>Try-with-resources</a:t>
+            </a:r>
+            <a:endParaRPr lang="en-US" dirty="0"/>
+          </a:p>
+        </p:txBody>
+      </p:sp>
+      <p:pic>
+        <p:nvPicPr>
+          <p:cNvPr id="4" name="Picture 3">
+            <a:extLst>
+              <a:ext uri="{FF2B5EF4-FFF2-40B4-BE49-F238E27FC236}">
+                <a16:creationId xmlns:a16="http://schemas.microsoft.com/office/drawing/2014/main" id="{A1E22186-753D-F423-DAC9-3D489B978D2F}"/>
+              </a:ext>
+            </a:extLst>
+          </p:cNvPr>
+          <p:cNvPicPr>
+            <a:picLocks noChangeAspect="1"/>
+          </p:cNvPicPr>
+          <p:nvPr/>
+        </p:nvPicPr>
+        <p:blipFill>
+          <a:blip r:embed="rId3">
+            <a:extLst>
+              <a:ext uri="{28A0092B-C50C-407E-A947-70E740481C1C}">
+                <a14:useLocalDpi xmlns:a14="http://schemas.microsoft.com/office/drawing/2010/main" val="0"/>
+              </a:ext>
+            </a:extLst>
+          </a:blip>
+          <a:srcRect/>
+          <a:stretch/>
+        </p:blipFill>
+        <p:spPr>
+          <a:xfrm>
+            <a:off x="1183485" y="2401598"/>
+            <a:ext cx="9921805" cy="3644744"/>
+          </a:xfrm>
+          <a:prstGeom prst="rect">
+            <a:avLst/>
+          </a:prstGeom>
+          <a:ln w="38100" cap="sq">
+            <a:solidFill>
+              <a:srgbClr val="000000"/>
+            </a:solidFill>
+            <a:prstDash val="solid"/>
+            <a:miter lim="800000"/>
+          </a:ln>
+          <a:effectLst>
+            <a:outerShdw blurRad="50800" dist="38100" dir="2700000" algn="tl" rotWithShape="0">
+              <a:srgbClr val="000000">
+                <a:alpha val="43000"/>
+              </a:srgbClr>
+            </a:outerShdw>
+          </a:effectLst>
+        </p:spPr>
+      </p:pic>
+      <p:sp>
+        <p:nvSpPr>
+          <p:cNvPr id="3" name="Rectangle 2">
+            <a:extLst>
+              <a:ext uri="{FF2B5EF4-FFF2-40B4-BE49-F238E27FC236}">
+                <a16:creationId xmlns:a16="http://schemas.microsoft.com/office/drawing/2014/main" id="{CC674C65-0ACA-1262-6D13-009F15C011B6}"/>
+              </a:ext>
+            </a:extLst>
+          </p:cNvPr>
+          <p:cNvSpPr/>
+          <p:nvPr/>
+        </p:nvSpPr>
+        <p:spPr>
+          <a:xfrm>
+            <a:off x="1783080" y="2827020"/>
+            <a:ext cx="9034146" cy="701040"/>
+          </a:xfrm>
+          <a:prstGeom prst="rect">
+            <a:avLst/>
+          </a:prstGeom>
+          <a:noFill/>
+          <a:ln w="57150">
+            <a:solidFill>
+              <a:srgbClr val="FFFF00"/>
+            </a:solidFill>
+          </a:ln>
+        </p:spPr>
+        <p:style>
+          <a:lnRef idx="2">
+            <a:schemeClr val="accent1">
+              <a:shade val="15000"/>
+            </a:schemeClr>
+          </a:lnRef>
+          <a:fillRef idx="1">
+            <a:schemeClr val="accent1"/>
+          </a:fillRef>
+          <a:effectRef idx="0">
+            <a:schemeClr val="accent1"/>
+          </a:effectRef>
+          <a:fontRef idx="minor">
+            <a:schemeClr val="lt1"/>
+          </a:fontRef>
+        </p:style>
+        <p:txBody>
+          <a:bodyPr rtlCol="0" anchor="ctr"/>
+          <a:lstStyle/>
+          <a:p>
+            <a:pPr algn="ctr"/>
+            <a:endParaRPr lang="en-US"/>
+          </a:p>
+        </p:txBody>
+      </p:sp>
+    </p:spTree>
+    <p:extLst>
+      <p:ext uri="{BB962C8B-B14F-4D97-AF65-F5344CB8AC3E}">
+        <p14:creationId xmlns:p14="http://schemas.microsoft.com/office/powerpoint/2010/main" val="1804964624"/>
+      </p:ext>
+    </p:extLst>
+  </p:cSld>
+  <p:clrMapOvr>
+    <a:masterClrMapping/>
+  </p:clrMapOvr>
+</p:sld>
+</file>
+
+<file path=ppt/slides/slide7.xml><?xml version="1.0" encoding="utf-8"?>
+<p:sld xmlns:a="http://schemas.openxmlformats.org/drawingml/2006/main" xmlns:r="http://schemas.openxmlformats.org/officeDocument/2006/relationships" xmlns:p="http://schemas.openxmlformats.org/presentationml/2006/main">
+  <p:cSld>
+    <p:spTree>
+      <p:nvGrpSpPr>
+        <p:cNvPr id="1" name=""/>
+        <p:cNvGrpSpPr/>
+        <p:nvPr/>
+      </p:nvGrpSpPr>
+      <p:grpSpPr>
+        <a:xfrm>
+          <a:off x="0" y="0"/>
+          <a:ext cx="0" cy="0"/>
+          <a:chOff x="0" y="0"/>
+          <a:chExt cx="0" cy="0"/>
+        </a:xfrm>
+      </p:grpSpPr>
+      <p:sp>
+        <p:nvSpPr>
+          <p:cNvPr id="2" name="Title 1">
+            <a:extLst>
+              <a:ext uri="{FF2B5EF4-FFF2-40B4-BE49-F238E27FC236}">
                 <a16:creationId xmlns:a16="http://schemas.microsoft.com/office/drawing/2014/main" id="{F35EA888-831A-B696-30C1-667C5B656BC0}"/>
               </a:ext>
             </a:extLst>
@@ -12047,18 +12721,181 @@
           </p:nvPr>
         </p:nvPicPr>
         <p:blipFill>
-          <a:blip r:embed="rId2"/>
+          <a:blip r:embed="rId3"/>
           <a:stretch>
             <a:fillRect/>
           </a:stretch>
         </p:blipFill>
         <p:spPr>
           <a:xfrm>
-            <a:off x="3044464" y="2141538"/>
-            <a:ext cx="5414096" cy="3649662"/>
+            <a:off x="685800" y="1604169"/>
+            <a:ext cx="11018519" cy="7427624"/>
           </a:xfrm>
         </p:spPr>
       </p:pic>
+      <p:sp>
+        <p:nvSpPr>
+          <p:cNvPr id="3" name="Rectangle: Rounded Corners 2">
+            <a:extLst>
+              <a:ext uri="{FF2B5EF4-FFF2-40B4-BE49-F238E27FC236}">
+                <a16:creationId xmlns:a16="http://schemas.microsoft.com/office/drawing/2014/main" id="{53362F66-91BD-7E47-1D36-5DC4639580D9}"/>
+              </a:ext>
+            </a:extLst>
+          </p:cNvPr>
+          <p:cNvSpPr/>
+          <p:nvPr/>
+        </p:nvSpPr>
+        <p:spPr>
+          <a:xfrm>
+            <a:off x="685801" y="3756660"/>
+            <a:ext cx="11003279" cy="3025140"/>
+          </a:xfrm>
+          <a:custGeom>
+            <a:avLst/>
+            <a:gdLst>
+              <a:gd name="connsiteX0" fmla="*/ 0 w 11003279"/>
+              <a:gd name="connsiteY0" fmla="*/ 504200 h 3025140"/>
+              <a:gd name="connsiteX1" fmla="*/ 504200 w 11003279"/>
+              <a:gd name="connsiteY1" fmla="*/ 0 h 3025140"/>
+              <a:gd name="connsiteX2" fmla="*/ 10499079 w 11003279"/>
+              <a:gd name="connsiteY2" fmla="*/ 0 h 3025140"/>
+              <a:gd name="connsiteX3" fmla="*/ 11003279 w 11003279"/>
+              <a:gd name="connsiteY3" fmla="*/ 504200 h 3025140"/>
+              <a:gd name="connsiteX4" fmla="*/ 11003279 w 11003279"/>
+              <a:gd name="connsiteY4" fmla="*/ 2520940 h 3025140"/>
+              <a:gd name="connsiteX5" fmla="*/ 10499079 w 11003279"/>
+              <a:gd name="connsiteY5" fmla="*/ 3025140 h 3025140"/>
+              <a:gd name="connsiteX6" fmla="*/ 504200 w 11003279"/>
+              <a:gd name="connsiteY6" fmla="*/ 3025140 h 3025140"/>
+              <a:gd name="connsiteX7" fmla="*/ 0 w 11003279"/>
+              <a:gd name="connsiteY7" fmla="*/ 2520940 h 3025140"/>
+              <a:gd name="connsiteX8" fmla="*/ 0 w 11003279"/>
+              <a:gd name="connsiteY8" fmla="*/ 504200 h 3025140"/>
+            </a:gdLst>
+            <a:ahLst/>
+            <a:cxnLst>
+              <a:cxn ang="0">
+                <a:pos x="connsiteX0" y="connsiteY0"/>
+              </a:cxn>
+              <a:cxn ang="0">
+                <a:pos x="connsiteX1" y="connsiteY1"/>
+              </a:cxn>
+              <a:cxn ang="0">
+                <a:pos x="connsiteX2" y="connsiteY2"/>
+              </a:cxn>
+              <a:cxn ang="0">
+                <a:pos x="connsiteX3" y="connsiteY3"/>
+              </a:cxn>
+              <a:cxn ang="0">
+                <a:pos x="connsiteX4" y="connsiteY4"/>
+              </a:cxn>
+              <a:cxn ang="0">
+                <a:pos x="connsiteX5" y="connsiteY5"/>
+              </a:cxn>
+              <a:cxn ang="0">
+                <a:pos x="connsiteX6" y="connsiteY6"/>
+              </a:cxn>
+              <a:cxn ang="0">
+                <a:pos x="connsiteX7" y="connsiteY7"/>
+              </a:cxn>
+              <a:cxn ang="0">
+                <a:pos x="connsiteX8" y="connsiteY8"/>
+              </a:cxn>
+            </a:cxnLst>
+            <a:rect l="l" t="t" r="r" b="b"/>
+            <a:pathLst>
+              <a:path w="11003279" h="3025140" extrusionOk="0">
+                <a:moveTo>
+                  <a:pt x="0" y="504200"/>
+                </a:moveTo>
+                <a:cubicBezTo>
+                  <a:pt x="-10718" y="244542"/>
+                  <a:pt x="210128" y="-6446"/>
+                  <a:pt x="504200" y="0"/>
+                </a:cubicBezTo>
+                <a:cubicBezTo>
+                  <a:pt x="3402076" y="-60713"/>
+                  <a:pt x="8730969" y="61072"/>
+                  <a:pt x="10499079" y="0"/>
+                </a:cubicBezTo>
+                <a:cubicBezTo>
+                  <a:pt x="10765171" y="4134"/>
+                  <a:pt x="10972212" y="262474"/>
+                  <a:pt x="11003279" y="504200"/>
+                </a:cubicBezTo>
+                <a:cubicBezTo>
+                  <a:pt x="11027731" y="1146732"/>
+                  <a:pt x="11070942" y="1587191"/>
+                  <a:pt x="11003279" y="2520940"/>
+                </a:cubicBezTo>
+                <a:cubicBezTo>
+                  <a:pt x="11013423" y="2789761"/>
+                  <a:pt x="10781157" y="3025379"/>
+                  <a:pt x="10499079" y="3025140"/>
+                </a:cubicBezTo>
+                <a:cubicBezTo>
+                  <a:pt x="6775247" y="2951369"/>
+                  <a:pt x="3468396" y="2869257"/>
+                  <a:pt x="504200" y="3025140"/>
+                </a:cubicBezTo>
+                <a:cubicBezTo>
+                  <a:pt x="233489" y="3026264"/>
+                  <a:pt x="-28051" y="2786600"/>
+                  <a:pt x="0" y="2520940"/>
+                </a:cubicBezTo>
+                <a:cubicBezTo>
+                  <a:pt x="152408" y="2184006"/>
+                  <a:pt x="73868" y="1250013"/>
+                  <a:pt x="0" y="504200"/>
+                </a:cubicBezTo>
+                <a:close/>
+              </a:path>
+            </a:pathLst>
+          </a:custGeom>
+          <a:noFill/>
+          <a:ln w="38100">
+            <a:solidFill>
+              <a:srgbClr val="FFFF00"/>
+            </a:solidFill>
+            <a:extLst>
+              <a:ext uri="{C807C97D-BFC1-408E-A445-0C87EB9F89A2}">
+                <ask:lineSketchStyleProps xmlns:ask="http://schemas.microsoft.com/office/drawing/2018/sketchyshapes" sd="981765707">
+                  <a:prstGeom prst="roundRect">
+                    <a:avLst/>
+                  </a:prstGeom>
+                  <ask:type>
+                    <ask:lineSketchCurved/>
+                  </ask:type>
+                </ask:lineSketchStyleProps>
+              </a:ext>
+            </a:extLst>
+          </a:ln>
+        </p:spPr>
+        <p:style>
+          <a:lnRef idx="2">
+            <a:schemeClr val="accent1">
+              <a:shade val="15000"/>
+            </a:schemeClr>
+          </a:lnRef>
+          <a:fillRef idx="1">
+            <a:schemeClr val="accent1"/>
+          </a:fillRef>
+          <a:effectRef idx="0">
+            <a:schemeClr val="accent1"/>
+          </a:effectRef>
+          <a:fontRef idx="minor">
+            <a:schemeClr val="lt1"/>
+          </a:fontRef>
+        </p:style>
+        <p:txBody>
+          <a:bodyPr rtlCol="0" anchor="ctr"/>
+          <a:lstStyle/>
+          <a:p>
+            <a:pPr algn="ctr"/>
+            <a:endParaRPr lang="en-US"/>
+          </a:p>
+        </p:txBody>
+      </p:sp>
     </p:spTree>
     <p:extLst>
       <p:ext uri="{BB962C8B-B14F-4D97-AF65-F5344CB8AC3E}">
@@ -12069,6 +12906,692 @@
   <p:clrMapOvr>
     <a:masterClrMapping/>
   </p:clrMapOvr>
+  <p:timing>
+    <p:tnLst>
+      <p:par>
+        <p:cTn id="1" dur="indefinite" restart="never" nodeType="tmRoot">
+          <p:childTnLst>
+            <p:seq concurrent="1" nextAc="seek">
+              <p:cTn id="2" dur="indefinite" nodeType="mainSeq">
+                <p:childTnLst>
+                  <p:par>
+                    <p:cTn id="3" fill="hold">
+                      <p:stCondLst>
+                        <p:cond delay="indefinite"/>
+                        <p:cond evt="onBegin" delay="0">
+                          <p:tn val="2"/>
+                        </p:cond>
+                      </p:stCondLst>
+                      <p:childTnLst>
+                        <p:par>
+                          <p:cTn id="4" fill="hold">
+                            <p:stCondLst>
+                              <p:cond delay="0"/>
+                            </p:stCondLst>
+                            <p:childTnLst>
+                              <p:par>
+                                <p:cTn id="5" presetID="10" presetClass="entr" presetSubtype="0" fill="hold" grpId="0" nodeType="withEffect">
+                                  <p:stCondLst>
+                                    <p:cond delay="0"/>
+                                  </p:stCondLst>
+                                  <p:childTnLst>
+                                    <p:set>
+                                      <p:cBhvr>
+                                        <p:cTn id="6" dur="1" fill="hold">
+                                          <p:stCondLst>
+                                            <p:cond delay="0"/>
+                                          </p:stCondLst>
+                                        </p:cTn>
+                                        <p:tgtEl>
+                                          <p:spTgt spid="3"/>
+                                        </p:tgtEl>
+                                        <p:attrNameLst>
+                                          <p:attrName>style.visibility</p:attrName>
+                                        </p:attrNameLst>
+                                      </p:cBhvr>
+                                      <p:to>
+                                        <p:strVal val="visible"/>
+                                      </p:to>
+                                    </p:set>
+                                    <p:animEffect transition="in" filter="fade">
+                                      <p:cBhvr>
+                                        <p:cTn id="7" dur="500"/>
+                                        <p:tgtEl>
+                                          <p:spTgt spid="3"/>
+                                        </p:tgtEl>
+                                      </p:cBhvr>
+                                    </p:animEffect>
+                                  </p:childTnLst>
+                                </p:cTn>
+                              </p:par>
+                            </p:childTnLst>
+                          </p:cTn>
+                        </p:par>
+                      </p:childTnLst>
+                    </p:cTn>
+                  </p:par>
+                </p:childTnLst>
+              </p:cTn>
+              <p:prevCondLst>
+                <p:cond evt="onPrev" delay="0">
+                  <p:tgtEl>
+                    <p:sldTgt/>
+                  </p:tgtEl>
+                </p:cond>
+              </p:prevCondLst>
+              <p:nextCondLst>
+                <p:cond evt="onNext" delay="0">
+                  <p:tgtEl>
+                    <p:sldTgt/>
+                  </p:tgtEl>
+                </p:cond>
+              </p:nextCondLst>
+            </p:seq>
+          </p:childTnLst>
+        </p:cTn>
+      </p:par>
+    </p:tnLst>
+    <p:bldLst>
+      <p:bldP spid="3" grpId="0" animBg="1"/>
+    </p:bldLst>
+  </p:timing>
+</p:sld>
+</file>
+
+<file path=ppt/slides/slide8.xml><?xml version="1.0" encoding="utf-8"?>
+<p:sld xmlns:a="http://schemas.openxmlformats.org/drawingml/2006/main" xmlns:r="http://schemas.openxmlformats.org/officeDocument/2006/relationships" xmlns:p="http://schemas.openxmlformats.org/presentationml/2006/main">
+  <p:cSld>
+    <p:bg>
+      <p:bgPr>
+        <a:blipFill>
+          <a:blip r:embed="rId2"/>
+          <a:stretch/>
+        </a:blipFill>
+        <a:effectLst/>
+      </p:bgPr>
+    </p:bg>
+    <p:spTree>
+      <p:nvGrpSpPr>
+        <p:cNvPr id="1" name=""/>
+        <p:cNvGrpSpPr/>
+        <p:nvPr/>
+      </p:nvGrpSpPr>
+      <p:grpSpPr>
+        <a:xfrm>
+          <a:off x="0" y="0"/>
+          <a:ext cx="0" cy="0"/>
+          <a:chOff x="0" y="0"/>
+          <a:chExt cx="0" cy="0"/>
+        </a:xfrm>
+      </p:grpSpPr>
+      <p:pic>
+        <p:nvPicPr>
+          <p:cNvPr id="14" name="Picture 13">
+            <a:extLst>
+              <a:ext uri="{FF2B5EF4-FFF2-40B4-BE49-F238E27FC236}">
+                <a16:creationId xmlns:a16="http://schemas.microsoft.com/office/drawing/2014/main" id="{CBECFFDC-94DB-4DA3-94FE-22FEDDA8FA30}"/>
+              </a:ext>
+              <a:ext uri="{C183D7F6-B498-43B3-948B-1728B52AA6E4}">
+                <adec:decorative xmlns:adec="http://schemas.microsoft.com/office/drawing/2017/decorative" val="1"/>
+              </a:ext>
+            </a:extLst>
+          </p:cNvPr>
+          <p:cNvPicPr>
+            <a:picLocks noGrp="1" noRot="1" noChangeAspect="1" noMove="1" noResize="1" noEditPoints="1" noAdjustHandles="1" noChangeArrowheads="1" noChangeShapeType="1" noCrop="1"/>
+          </p:cNvPicPr>
+          <p:nvPr>
+            <p:extLst>
+              <p:ext uri="{386F3935-93C4-4BCD-93E2-E3B085C9AB24}">
+                <p16:designElem xmlns:p16="http://schemas.microsoft.com/office/powerpoint/2015/main" val="1"/>
+              </p:ext>
+            </p:extLst>
+          </p:nvPr>
+        </p:nvPicPr>
+        <p:blipFill>
+          <a:blip r:embed="rId3">
+            <a:extLst>
+              <a:ext uri="{28A0092B-C50C-407E-A947-70E740481C1C}">
+                <a14:useLocalDpi xmlns:a14="http://schemas.microsoft.com/office/drawing/2010/main" val="0"/>
+              </a:ext>
+            </a:extLst>
+          </a:blip>
+          <a:stretch>
+            <a:fillRect/>
+          </a:stretch>
+        </p:blipFill>
+        <p:spPr>
+          <a:xfrm>
+            <a:off x="0" y="0"/>
+            <a:ext cx="12188825" cy="6856214"/>
+          </a:xfrm>
+          <a:prstGeom prst="rect">
+            <a:avLst/>
+          </a:prstGeom>
+        </p:spPr>
+      </p:pic>
+      <p:sp useBgFill="1">
+        <p:nvSpPr>
+          <p:cNvPr id="15" name="Rectangle 14">
+            <a:extLst>
+              <a:ext uri="{FF2B5EF4-FFF2-40B4-BE49-F238E27FC236}">
+                <a16:creationId xmlns:a16="http://schemas.microsoft.com/office/drawing/2014/main" id="{0DC895F7-4E59-40FB-87DD-ACE47F94C143}"/>
+              </a:ext>
+              <a:ext uri="{C183D7F6-B498-43B3-948B-1728B52AA6E4}">
+                <adec:decorative xmlns:adec="http://schemas.microsoft.com/office/drawing/2017/decorative" val="1"/>
+              </a:ext>
+            </a:extLst>
+          </p:cNvPr>
+          <p:cNvSpPr>
+            <a:spLocks noGrp="1" noRot="1" noChangeAspect="1" noMove="1" noResize="1" noEditPoints="1" noAdjustHandles="1" noChangeArrowheads="1" noChangeShapeType="1" noTextEdit="1"/>
+          </p:cNvSpPr>
+          <p:nvPr>
+            <p:extLst>
+              <p:ext uri="{386F3935-93C4-4BCD-93E2-E3B085C9AB24}">
+                <p16:designElem xmlns:p16="http://schemas.microsoft.com/office/powerpoint/2015/main" val="1"/>
+              </p:ext>
+            </p:extLst>
+          </p:nvPr>
+        </p:nvSpPr>
+        <p:spPr>
+          <a:xfrm>
+            <a:off x="0" y="0"/>
+            <a:ext cx="12188825" cy="6856214"/>
+          </a:xfrm>
+          <a:prstGeom prst="rect">
+            <a:avLst/>
+          </a:prstGeom>
+          <a:ln>
+            <a:noFill/>
+          </a:ln>
+        </p:spPr>
+        <p:style>
+          <a:lnRef idx="2">
+            <a:schemeClr val="accent1">
+              <a:shade val="50000"/>
+            </a:schemeClr>
+          </a:lnRef>
+          <a:fillRef idx="1">
+            <a:schemeClr val="accent1"/>
+          </a:fillRef>
+          <a:effectRef idx="0">
+            <a:schemeClr val="accent1"/>
+          </a:effectRef>
+          <a:fontRef idx="minor">
+            <a:schemeClr val="lt1"/>
+          </a:fontRef>
+        </p:style>
+        <p:txBody>
+          <a:bodyPr rtlCol="0" anchor="ctr"/>
+          <a:lstStyle/>
+          <a:p>
+            <a:pPr algn="ctr"/>
+            <a:endParaRPr lang="en-US"/>
+          </a:p>
+        </p:txBody>
+      </p:sp>
+      <p:pic>
+        <p:nvPicPr>
+          <p:cNvPr id="16" name="Picture 15" descr="Close up image of hands applauding">
+            <a:extLst>
+              <a:ext uri="{FF2B5EF4-FFF2-40B4-BE49-F238E27FC236}">
+                <a16:creationId xmlns:a16="http://schemas.microsoft.com/office/drawing/2014/main" id="{EDB75AAA-90E5-3B7B-F9D7-77C7E163BB3A}"/>
+              </a:ext>
+            </a:extLst>
+          </p:cNvPr>
+          <p:cNvPicPr>
+            <a:picLocks noChangeAspect="1"/>
+          </p:cNvPicPr>
+          <p:nvPr/>
+        </p:nvPicPr>
+        <p:blipFill rotWithShape="1">
+          <a:blip r:embed="rId4">
+            <a:alphaModFix amt="20000"/>
+          </a:blip>
+          <a:srcRect t="596" b="15134"/>
+          <a:stretch/>
+        </p:blipFill>
+        <p:spPr>
+          <a:xfrm>
+            <a:off x="20" y="10"/>
+            <a:ext cx="12191980" cy="6857990"/>
+          </a:xfrm>
+          <a:prstGeom prst="rect">
+            <a:avLst/>
+          </a:prstGeom>
+        </p:spPr>
+      </p:pic>
+      <p:pic>
+        <p:nvPicPr>
+          <p:cNvPr id="17" name="Picture 16">
+            <a:extLst>
+              <a:ext uri="{FF2B5EF4-FFF2-40B4-BE49-F238E27FC236}">
+                <a16:creationId xmlns:a16="http://schemas.microsoft.com/office/drawing/2014/main" id="{1A4C720E-710D-44F8-A8D7-2BAA61E1814B}"/>
+              </a:ext>
+              <a:ext uri="{C183D7F6-B498-43B3-948B-1728B52AA6E4}">
+                <adec:decorative xmlns:adec="http://schemas.microsoft.com/office/drawing/2017/decorative" val="1"/>
+              </a:ext>
+            </a:extLst>
+          </p:cNvPr>
+          <p:cNvPicPr>
+            <a:picLocks noGrp="1" noRot="1" noChangeAspect="1" noMove="1" noResize="1" noEditPoints="1" noAdjustHandles="1" noChangeArrowheads="1" noChangeShapeType="1" noCrop="1"/>
+          </p:cNvPicPr>
+          <p:nvPr>
+            <p:extLst>
+              <p:ext uri="{386F3935-93C4-4BCD-93E2-E3B085C9AB24}">
+                <p16:designElem xmlns:p16="http://schemas.microsoft.com/office/powerpoint/2015/main" val="1"/>
+              </p:ext>
+            </p:extLst>
+          </p:nvPr>
+        </p:nvPicPr>
+        <p:blipFill>
+          <a:blip r:embed="rId3">
+            <a:alphaModFix amt="51000"/>
+            <a:extLst>
+              <a:ext uri="{28A0092B-C50C-407E-A947-70E740481C1C}">
+                <a14:useLocalDpi xmlns:a14="http://schemas.microsoft.com/office/drawing/2010/main" val="0"/>
+              </a:ext>
+            </a:extLst>
+          </a:blip>
+          <a:stretch>
+            <a:fillRect/>
+          </a:stretch>
+        </p:blipFill>
+        <p:spPr>
+          <a:xfrm>
+            <a:off x="0" y="0"/>
+            <a:ext cx="12188825" cy="6856214"/>
+          </a:xfrm>
+          <a:prstGeom prst="rect">
+            <a:avLst/>
+          </a:prstGeom>
+        </p:spPr>
+      </p:pic>
+      <p:sp>
+        <p:nvSpPr>
+          <p:cNvPr id="2" name="Title 1">
+            <a:extLst>
+              <a:ext uri="{FF2B5EF4-FFF2-40B4-BE49-F238E27FC236}">
+                <a16:creationId xmlns:a16="http://schemas.microsoft.com/office/drawing/2014/main" id="{31E77420-BC74-D523-DD84-61B279B80231}"/>
+              </a:ext>
+            </a:extLst>
+          </p:cNvPr>
+          <p:cNvSpPr>
+            <a:spLocks noGrp="1"/>
+          </p:cNvSpPr>
+          <p:nvPr>
+            <p:ph type="title"/>
+          </p:nvPr>
+        </p:nvSpPr>
+        <p:spPr>
+          <a:xfrm>
+            <a:off x="3962399" y="1964267"/>
+            <a:ext cx="7197726" cy="2421464"/>
+          </a:xfrm>
+        </p:spPr>
+        <p:txBody>
+          <a:bodyPr vert="horz" lIns="91440" tIns="45720" rIns="91440" bIns="45720" rtlCol="0" anchor="b">
+            <a:normAutofit/>
+          </a:bodyPr>
+          <a:lstStyle/>
+          <a:p>
+            <a:pPr algn="r"/>
+            <a:r>
+              <a:rPr lang="en-US" sz="4800" dirty="0"/>
+              <a:t>THANK YOU FOR LISTENING!</a:t>
+            </a:r>
+          </a:p>
+        </p:txBody>
+      </p:sp>
+      <p:sp>
+        <p:nvSpPr>
+          <p:cNvPr id="5" name="TextBox 4">
+            <a:extLst>
+              <a:ext uri="{FF2B5EF4-FFF2-40B4-BE49-F238E27FC236}">
+                <a16:creationId xmlns:a16="http://schemas.microsoft.com/office/drawing/2014/main" id="{D57B57C2-D3A3-5AD9-2332-8E29E2776368}"/>
+              </a:ext>
+            </a:extLst>
+          </p:cNvPr>
+          <p:cNvSpPr txBox="1"/>
+          <p:nvPr/>
+        </p:nvSpPr>
+        <p:spPr>
+          <a:xfrm>
+            <a:off x="6934834" y="5343973"/>
+            <a:ext cx="4144645" cy="923330"/>
+          </a:xfrm>
+          <a:prstGeom prst="rect">
+            <a:avLst/>
+          </a:prstGeom>
+          <a:noFill/>
+          <a:ln w="38100" cap="flat" cmpd="sng" algn="ctr">
+            <a:solidFill>
+              <a:srgbClr val="FF0000"/>
+            </a:solidFill>
+            <a:prstDash val="solid"/>
+            <a:round/>
+            <a:headEnd type="none" w="med" len="med"/>
+            <a:tailEnd type="none" w="med" len="med"/>
+          </a:ln>
+        </p:spPr>
+        <p:style>
+          <a:lnRef idx="0">
+            <a:scrgbClr r="0" g="0" b="0"/>
+          </a:lnRef>
+          <a:fillRef idx="0">
+            <a:scrgbClr r="0" g="0" b="0"/>
+          </a:fillRef>
+          <a:effectRef idx="0">
+            <a:scrgbClr r="0" g="0" b="0"/>
+          </a:effectRef>
+          <a:fontRef idx="minor">
+            <a:schemeClr val="accent6"/>
+          </a:fontRef>
+        </p:style>
+        <p:txBody>
+          <a:bodyPr wrap="square" rtlCol="0">
+            <a:spAutoFit/>
+          </a:bodyPr>
+          <a:lstStyle/>
+          <a:p>
+            <a:pPr algn="ctr"/>
+            <a:r>
+              <a:rPr lang="en-US" sz="5400" dirty="0">
+                <a:solidFill>
+                  <a:srgbClr val="FF0000"/>
+                </a:solidFill>
+              </a:rPr>
+              <a:t>APPLAUSE</a:t>
+            </a:r>
+          </a:p>
+        </p:txBody>
+      </p:sp>
+    </p:spTree>
+    <p:extLst>
+      <p:ext uri="{BB962C8B-B14F-4D97-AF65-F5344CB8AC3E}">
+        <p14:creationId xmlns:p14="http://schemas.microsoft.com/office/powerpoint/2010/main" val="1040849130"/>
+      </p:ext>
+    </p:extLst>
+  </p:cSld>
+  <p:clrMapOvr>
+    <a:masterClrMapping/>
+  </p:clrMapOvr>
+  <p:timing>
+    <p:tnLst>
+      <p:par>
+        <p:cTn id="1" dur="indefinite" restart="never" nodeType="tmRoot">
+          <p:childTnLst>
+            <p:seq concurrent="1" nextAc="seek">
+              <p:cTn id="2" dur="indefinite" nodeType="mainSeq">
+                <p:childTnLst>
+                  <p:par>
+                    <p:cTn id="3" fill="hold">
+                      <p:stCondLst>
+                        <p:cond delay="indefinite"/>
+                        <p:cond evt="onBegin" delay="0">
+                          <p:tn val="2"/>
+                        </p:cond>
+                      </p:stCondLst>
+                      <p:childTnLst>
+                        <p:par>
+                          <p:cTn id="4" fill="hold">
+                            <p:stCondLst>
+                              <p:cond delay="0"/>
+                            </p:stCondLst>
+                            <p:childTnLst>
+                              <p:par>
+                                <p:cTn id="5" presetID="10" presetClass="entr" presetSubtype="0" fill="hold" grpId="0" nodeType="withEffect">
+                                  <p:stCondLst>
+                                    <p:cond delay="1000"/>
+                                  </p:stCondLst>
+                                  <p:iterate type="lt">
+                                    <p:tmPct val="10000"/>
+                                  </p:iterate>
+                                  <p:childTnLst>
+                                    <p:set>
+                                      <p:cBhvr>
+                                        <p:cTn id="6" dur="1" fill="hold">
+                                          <p:stCondLst>
+                                            <p:cond delay="0"/>
+                                          </p:stCondLst>
+                                        </p:cTn>
+                                        <p:tgtEl>
+                                          <p:spTgt spid="2"/>
+                                        </p:tgtEl>
+                                        <p:attrNameLst>
+                                          <p:attrName>style.visibility</p:attrName>
+                                        </p:attrNameLst>
+                                      </p:cBhvr>
+                                      <p:to>
+                                        <p:strVal val="visible"/>
+                                      </p:to>
+                                    </p:set>
+                                    <p:animEffect transition="in" filter="fade">
+                                      <p:cBhvr>
+                                        <p:cTn id="7" dur="400"/>
+                                        <p:tgtEl>
+                                          <p:spTgt spid="2"/>
+                                        </p:tgtEl>
+                                      </p:cBhvr>
+                                    </p:animEffect>
+                                  </p:childTnLst>
+                                </p:cTn>
+                              </p:par>
+                            </p:childTnLst>
+                          </p:cTn>
+                        </p:par>
+                        <p:par>
+                          <p:cTn id="8" fill="hold">
+                            <p:stCondLst>
+                              <p:cond delay="2200"/>
+                            </p:stCondLst>
+                            <p:childTnLst>
+                              <p:par>
+                                <p:cTn id="9" presetID="1" presetClass="entr" presetSubtype="0" fill="hold" grpId="0" nodeType="afterEffect">
+                                  <p:stCondLst>
+                                    <p:cond delay="1000"/>
+                                  </p:stCondLst>
+                                  <p:childTnLst>
+                                    <p:set>
+                                      <p:cBhvr>
+                                        <p:cTn id="10" dur="1" fill="hold">
+                                          <p:stCondLst>
+                                            <p:cond delay="499"/>
+                                          </p:stCondLst>
+                                        </p:cTn>
+                                        <p:tgtEl>
+                                          <p:spTgt spid="5"/>
+                                        </p:tgtEl>
+                                        <p:attrNameLst>
+                                          <p:attrName>style.visibility</p:attrName>
+                                        </p:attrNameLst>
+                                      </p:cBhvr>
+                                      <p:to>
+                                        <p:strVal val="visible"/>
+                                      </p:to>
+                                    </p:set>
+                                  </p:childTnLst>
+                                </p:cTn>
+                              </p:par>
+                            </p:childTnLst>
+                          </p:cTn>
+                        </p:par>
+                        <p:par>
+                          <p:cTn id="11" fill="hold">
+                            <p:stCondLst>
+                              <p:cond delay="3700"/>
+                            </p:stCondLst>
+                            <p:childTnLst>
+                              <p:par>
+                                <p:cTn id="12" presetID="1" presetClass="exit" presetSubtype="0" fill="hold" grpId="1" nodeType="afterEffect">
+                                  <p:stCondLst>
+                                    <p:cond delay="0"/>
+                                  </p:stCondLst>
+                                  <p:childTnLst>
+                                    <p:set>
+                                      <p:cBhvr>
+                                        <p:cTn id="13" dur="1" fill="hold">
+                                          <p:stCondLst>
+                                            <p:cond delay="499"/>
+                                          </p:stCondLst>
+                                        </p:cTn>
+                                        <p:tgtEl>
+                                          <p:spTgt spid="5"/>
+                                        </p:tgtEl>
+                                        <p:attrNameLst>
+                                          <p:attrName>style.visibility</p:attrName>
+                                        </p:attrNameLst>
+                                      </p:cBhvr>
+                                      <p:to>
+                                        <p:strVal val="hidden"/>
+                                      </p:to>
+                                    </p:set>
+                                  </p:childTnLst>
+                                </p:cTn>
+                              </p:par>
+                            </p:childTnLst>
+                          </p:cTn>
+                        </p:par>
+                        <p:par>
+                          <p:cTn id="14" fill="hold">
+                            <p:stCondLst>
+                              <p:cond delay="4200"/>
+                            </p:stCondLst>
+                            <p:childTnLst>
+                              <p:par>
+                                <p:cTn id="15" presetID="1" presetClass="entr" presetSubtype="0" fill="hold" grpId="2" nodeType="afterEffect">
+                                  <p:stCondLst>
+                                    <p:cond delay="0"/>
+                                  </p:stCondLst>
+                                  <p:childTnLst>
+                                    <p:set>
+                                      <p:cBhvr>
+                                        <p:cTn id="16" dur="1" fill="hold">
+                                          <p:stCondLst>
+                                            <p:cond delay="499"/>
+                                          </p:stCondLst>
+                                        </p:cTn>
+                                        <p:tgtEl>
+                                          <p:spTgt spid="5"/>
+                                        </p:tgtEl>
+                                        <p:attrNameLst>
+                                          <p:attrName>style.visibility</p:attrName>
+                                        </p:attrNameLst>
+                                      </p:cBhvr>
+                                      <p:to>
+                                        <p:strVal val="visible"/>
+                                      </p:to>
+                                    </p:set>
+                                  </p:childTnLst>
+                                </p:cTn>
+                              </p:par>
+                            </p:childTnLst>
+                          </p:cTn>
+                        </p:par>
+                        <p:par>
+                          <p:cTn id="17" fill="hold">
+                            <p:stCondLst>
+                              <p:cond delay="4700"/>
+                            </p:stCondLst>
+                            <p:childTnLst>
+                              <p:par>
+                                <p:cTn id="18" presetID="1" presetClass="exit" presetSubtype="0" fill="hold" grpId="3" nodeType="afterEffect">
+                                  <p:stCondLst>
+                                    <p:cond delay="0"/>
+                                  </p:stCondLst>
+                                  <p:childTnLst>
+                                    <p:set>
+                                      <p:cBhvr>
+                                        <p:cTn id="19" dur="1" fill="hold">
+                                          <p:stCondLst>
+                                            <p:cond delay="499"/>
+                                          </p:stCondLst>
+                                        </p:cTn>
+                                        <p:tgtEl>
+                                          <p:spTgt spid="5"/>
+                                        </p:tgtEl>
+                                        <p:attrNameLst>
+                                          <p:attrName>style.visibility</p:attrName>
+                                        </p:attrNameLst>
+                                      </p:cBhvr>
+                                      <p:to>
+                                        <p:strVal val="hidden"/>
+                                      </p:to>
+                                    </p:set>
+                                  </p:childTnLst>
+                                </p:cTn>
+                              </p:par>
+                            </p:childTnLst>
+                          </p:cTn>
+                        </p:par>
+                        <p:par>
+                          <p:cTn id="20" fill="hold">
+                            <p:stCondLst>
+                              <p:cond delay="5200"/>
+                            </p:stCondLst>
+                            <p:childTnLst>
+                              <p:par>
+                                <p:cTn id="21" presetID="1" presetClass="entr" presetSubtype="0" fill="hold" grpId="4" nodeType="afterEffect">
+                                  <p:stCondLst>
+                                    <p:cond delay="0"/>
+                                  </p:stCondLst>
+                                  <p:childTnLst>
+                                    <p:set>
+                                      <p:cBhvr>
+                                        <p:cTn id="22" dur="1" fill="hold">
+                                          <p:stCondLst>
+                                            <p:cond delay="499"/>
+                                          </p:stCondLst>
+                                        </p:cTn>
+                                        <p:tgtEl>
+                                          <p:spTgt spid="5"/>
+                                        </p:tgtEl>
+                                        <p:attrNameLst>
+                                          <p:attrName>style.visibility</p:attrName>
+                                        </p:attrNameLst>
+                                      </p:cBhvr>
+                                      <p:to>
+                                        <p:strVal val="visible"/>
+                                      </p:to>
+                                    </p:set>
+                                  </p:childTnLst>
+                                </p:cTn>
+                              </p:par>
+                            </p:childTnLst>
+                          </p:cTn>
+                        </p:par>
+                      </p:childTnLst>
+                    </p:cTn>
+                  </p:par>
+                </p:childTnLst>
+              </p:cTn>
+              <p:prevCondLst>
+                <p:cond evt="onPrev" delay="0">
+                  <p:tgtEl>
+                    <p:sldTgt/>
+                  </p:tgtEl>
+                </p:cond>
+              </p:prevCondLst>
+              <p:nextCondLst>
+                <p:cond evt="onNext" delay="0">
+                  <p:tgtEl>
+                    <p:sldTgt/>
+                  </p:tgtEl>
+                </p:cond>
+              </p:nextCondLst>
+            </p:seq>
+          </p:childTnLst>
+        </p:cTn>
+      </p:par>
+    </p:tnLst>
+    <p:bldLst>
+      <p:bldP spid="2" grpId="0"/>
+      <p:bldP spid="5" grpId="0" animBg="1"/>
+      <p:bldP spid="5" grpId="1" animBg="1"/>
+      <p:bldP spid="5" grpId="2" animBg="1"/>
+      <p:bldP spid="5" grpId="3" animBg="1"/>
+      <p:bldP spid="5" grpId="4" animBg="1"/>
+    </p:bldLst>
+  </p:timing>
 </p:sld>
 </file>
 

</xml_diff>

<commit_message>
week7 tuesday assignment. First commit of 2024 :)
</commit_message>
<xml_diff>
--- a/Assignments/bin/com/skillstorm/assignments/week6/Thursday/try-with-resources.pptx
+++ b/Assignments/bin/com/skillstorm/assignments/week6/Thursday/try-with-resources.pptx
@@ -994,7 +994,7 @@
           <a:p>
             <a:r>
               <a:rPr lang="en-US" dirty="0"/>
-              <a:t>This code is also starting to get a little cumbersome, and there is STILL the possibility of a resource leak if the print line and close methods BOTH throw exceptions!</a:t>
+              <a:t>This code is also starting to get a little cumbersome, and there is STILL the possibility of a resource leak if an exception is thrown here in the finally block!</a:t>
             </a:r>
           </a:p>
           <a:p>
@@ -12731,6 +12731,23 @@
             <a:off x="685800" y="1604169"/>
             <a:ext cx="11018519" cy="7427624"/>
           </a:xfrm>
+          <a:prstGeom prst="rect">
+            <a:avLst/>
+          </a:prstGeom>
+          <a:ln w="38100" cap="sq">
+            <a:solidFill>
+              <a:srgbClr val="000000"/>
+            </a:solidFill>
+            <a:prstDash val="solid"/>
+            <a:miter lim="800000"/>
+          </a:ln>
+          <a:effectLst>
+            <a:outerShdw blurRad="50800" dist="38100" dir="2700000" algn="tl" rotWithShape="0">
+              <a:srgbClr val="000000">
+                <a:alpha val="43000"/>
+              </a:srgbClr>
+            </a:outerShdw>
+          </a:effectLst>
         </p:spPr>
       </p:pic>
       <p:sp>
@@ -13242,69 +13259,6 @@
           </a:p>
         </p:txBody>
       </p:sp>
-      <p:sp>
-        <p:nvSpPr>
-          <p:cNvPr id="5" name="TextBox 4">
-            <a:extLst>
-              <a:ext uri="{FF2B5EF4-FFF2-40B4-BE49-F238E27FC236}">
-                <a16:creationId xmlns:a16="http://schemas.microsoft.com/office/drawing/2014/main" id="{D57B57C2-D3A3-5AD9-2332-8E29E2776368}"/>
-              </a:ext>
-            </a:extLst>
-          </p:cNvPr>
-          <p:cNvSpPr txBox="1"/>
-          <p:nvPr/>
-        </p:nvSpPr>
-        <p:spPr>
-          <a:xfrm>
-            <a:off x="6934834" y="5343973"/>
-            <a:ext cx="4144645" cy="923330"/>
-          </a:xfrm>
-          <a:prstGeom prst="rect">
-            <a:avLst/>
-          </a:prstGeom>
-          <a:noFill/>
-          <a:ln w="38100" cap="flat" cmpd="sng" algn="ctr">
-            <a:solidFill>
-              <a:srgbClr val="FF0000"/>
-            </a:solidFill>
-            <a:prstDash val="solid"/>
-            <a:round/>
-            <a:headEnd type="none" w="med" len="med"/>
-            <a:tailEnd type="none" w="med" len="med"/>
-          </a:ln>
-        </p:spPr>
-        <p:style>
-          <a:lnRef idx="0">
-            <a:scrgbClr r="0" g="0" b="0"/>
-          </a:lnRef>
-          <a:fillRef idx="0">
-            <a:scrgbClr r="0" g="0" b="0"/>
-          </a:fillRef>
-          <a:effectRef idx="0">
-            <a:scrgbClr r="0" g="0" b="0"/>
-          </a:effectRef>
-          <a:fontRef idx="minor">
-            <a:schemeClr val="accent6"/>
-          </a:fontRef>
-        </p:style>
-        <p:txBody>
-          <a:bodyPr wrap="square" rtlCol="0">
-            <a:spAutoFit/>
-          </a:bodyPr>
-          <a:lstStyle/>
-          <a:p>
-            <a:pPr algn="ctr"/>
-            <a:r>
-              <a:rPr lang="en-US" sz="5400" dirty="0">
-                <a:solidFill>
-                  <a:srgbClr val="FF0000"/>
-                </a:solidFill>
-              </a:rPr>
-              <a:t>APPLAUSE</a:t>
-            </a:r>
-          </a:p>
-        </p:txBody>
-      </p:sp>
     </p:spTree>
     <p:extLst>
       <p:ext uri="{BB962C8B-B14F-4D97-AF65-F5344CB8AC3E}">
@@ -13379,186 +13333,6 @@
                             </p:childTnLst>
                           </p:cTn>
                         </p:par>
-                        <p:par>
-                          <p:cTn id="8" fill="hold">
-                            <p:stCondLst>
-                              <p:cond delay="2200"/>
-                            </p:stCondLst>
-                            <p:childTnLst>
-                              <p:par>
-                                <p:cTn id="9" presetID="1" presetClass="entr" presetSubtype="0" fill="hold" grpId="0" nodeType="afterEffect">
-                                  <p:stCondLst>
-                                    <p:cond delay="1000"/>
-                                  </p:stCondLst>
-                                  <p:childTnLst>
-                                    <p:set>
-                                      <p:cBhvr>
-                                        <p:cTn id="10" dur="1" fill="hold">
-                                          <p:stCondLst>
-                                            <p:cond delay="499"/>
-                                          </p:stCondLst>
-                                        </p:cTn>
-                                        <p:tgtEl>
-                                          <p:spTgt spid="5"/>
-                                        </p:tgtEl>
-                                        <p:attrNameLst>
-                                          <p:attrName>style.visibility</p:attrName>
-                                        </p:attrNameLst>
-                                      </p:cBhvr>
-                                      <p:to>
-                                        <p:strVal val="visible"/>
-                                      </p:to>
-                                    </p:set>
-                                  </p:childTnLst>
-                                </p:cTn>
-                              </p:par>
-                            </p:childTnLst>
-                          </p:cTn>
-                        </p:par>
-                        <p:par>
-                          <p:cTn id="11" fill="hold">
-                            <p:stCondLst>
-                              <p:cond delay="3700"/>
-                            </p:stCondLst>
-                            <p:childTnLst>
-                              <p:par>
-                                <p:cTn id="12" presetID="1" presetClass="exit" presetSubtype="0" fill="hold" grpId="1" nodeType="afterEffect">
-                                  <p:stCondLst>
-                                    <p:cond delay="0"/>
-                                  </p:stCondLst>
-                                  <p:childTnLst>
-                                    <p:set>
-                                      <p:cBhvr>
-                                        <p:cTn id="13" dur="1" fill="hold">
-                                          <p:stCondLst>
-                                            <p:cond delay="499"/>
-                                          </p:stCondLst>
-                                        </p:cTn>
-                                        <p:tgtEl>
-                                          <p:spTgt spid="5"/>
-                                        </p:tgtEl>
-                                        <p:attrNameLst>
-                                          <p:attrName>style.visibility</p:attrName>
-                                        </p:attrNameLst>
-                                      </p:cBhvr>
-                                      <p:to>
-                                        <p:strVal val="hidden"/>
-                                      </p:to>
-                                    </p:set>
-                                  </p:childTnLst>
-                                </p:cTn>
-                              </p:par>
-                            </p:childTnLst>
-                          </p:cTn>
-                        </p:par>
-                        <p:par>
-                          <p:cTn id="14" fill="hold">
-                            <p:stCondLst>
-                              <p:cond delay="4200"/>
-                            </p:stCondLst>
-                            <p:childTnLst>
-                              <p:par>
-                                <p:cTn id="15" presetID="1" presetClass="entr" presetSubtype="0" fill="hold" grpId="2" nodeType="afterEffect">
-                                  <p:stCondLst>
-                                    <p:cond delay="0"/>
-                                  </p:stCondLst>
-                                  <p:childTnLst>
-                                    <p:set>
-                                      <p:cBhvr>
-                                        <p:cTn id="16" dur="1" fill="hold">
-                                          <p:stCondLst>
-                                            <p:cond delay="499"/>
-                                          </p:stCondLst>
-                                        </p:cTn>
-                                        <p:tgtEl>
-                                          <p:spTgt spid="5"/>
-                                        </p:tgtEl>
-                                        <p:attrNameLst>
-                                          <p:attrName>style.visibility</p:attrName>
-                                        </p:attrNameLst>
-                                      </p:cBhvr>
-                                      <p:to>
-                                        <p:strVal val="visible"/>
-                                      </p:to>
-                                    </p:set>
-                                  </p:childTnLst>
-                                </p:cTn>
-                              </p:par>
-                            </p:childTnLst>
-                          </p:cTn>
-                        </p:par>
-                        <p:par>
-                          <p:cTn id="17" fill="hold">
-                            <p:stCondLst>
-                              <p:cond delay="4700"/>
-                            </p:stCondLst>
-                            <p:childTnLst>
-                              <p:par>
-                                <p:cTn id="18" presetID="1" presetClass="exit" presetSubtype="0" fill="hold" grpId="3" nodeType="afterEffect">
-                                  <p:stCondLst>
-                                    <p:cond delay="0"/>
-                                  </p:stCondLst>
-                                  <p:childTnLst>
-                                    <p:set>
-                                      <p:cBhvr>
-                                        <p:cTn id="19" dur="1" fill="hold">
-                                          <p:stCondLst>
-                                            <p:cond delay="499"/>
-                                          </p:stCondLst>
-                                        </p:cTn>
-                                        <p:tgtEl>
-                                          <p:spTgt spid="5"/>
-                                        </p:tgtEl>
-                                        <p:attrNameLst>
-                                          <p:attrName>style.visibility</p:attrName>
-                                        </p:attrNameLst>
-                                      </p:cBhvr>
-                                      <p:to>
-                                        <p:strVal val="hidden"/>
-                                      </p:to>
-                                    </p:set>
-                                  </p:childTnLst>
-                                </p:cTn>
-                              </p:par>
-                            </p:childTnLst>
-                          </p:cTn>
-                        </p:par>
-                        <p:par>
-                          <p:cTn id="20" fill="hold">
-                            <p:stCondLst>
-                              <p:cond delay="5200"/>
-                            </p:stCondLst>
-                            <p:childTnLst>
-                              <p:par>
-                                <p:cTn id="21" presetID="1" presetClass="entr" presetSubtype="0" fill="hold" grpId="4" nodeType="afterEffect">
-                                  <p:stCondLst>
-                                    <p:cond delay="0"/>
-                                  </p:stCondLst>
-                                  <p:childTnLst>
-                                    <p:set>
-                                      <p:cBhvr>
-                                        <p:cTn id="22" dur="1" fill="hold">
-                                          <p:stCondLst>
-                                            <p:cond delay="499"/>
-                                          </p:stCondLst>
-                                        </p:cTn>
-                                        <p:tgtEl>
-                                          <p:spTgt spid="5"/>
-                                        </p:tgtEl>
-                                        <p:attrNameLst>
-                                          <p:attrName>style.visibility</p:attrName>
-                                        </p:attrNameLst>
-                                      </p:cBhvr>
-                                      <p:to>
-                                        <p:strVal val="visible"/>
-                                      </p:to>
-                                    </p:set>
-                                  </p:childTnLst>
-                                </p:cTn>
-                              </p:par>
-                            </p:childTnLst>
-                          </p:cTn>
-                        </p:par>
                       </p:childTnLst>
                     </p:cTn>
                   </p:par>
@@ -13585,11 +13359,6 @@
     </p:tnLst>
     <p:bldLst>
       <p:bldP spid="2" grpId="0"/>
-      <p:bldP spid="5" grpId="0" animBg="1"/>
-      <p:bldP spid="5" grpId="1" animBg="1"/>
-      <p:bldP spid="5" grpId="2" animBg="1"/>
-      <p:bldP spid="5" grpId="3" animBg="1"/>
-      <p:bldP spid="5" grpId="4" animBg="1"/>
     </p:bldLst>
   </p:timing>
 </p:sld>

</xml_diff>